<commit_message>
Postępy w pracy nad prezentacją
</commit_message>
<xml_diff>
--- a/Morphing obrazów.pptx
+++ b/Morphing obrazów.pptx
@@ -14,8 +14,11 @@
     <p:sldId id="260" r:id="rId8"/>
     <p:sldId id="263" r:id="rId9"/>
     <p:sldId id="264" r:id="rId10"/>
-    <p:sldId id="265" r:id="rId11"/>
-    <p:sldId id="266" r:id="rId12"/>
+    <p:sldId id="267" r:id="rId11"/>
+    <p:sldId id="265" r:id="rId12"/>
+    <p:sldId id="268" r:id="rId13"/>
+    <p:sldId id="269" r:id="rId14"/>
+    <p:sldId id="266" r:id="rId15"/>
   </p:sldIdLst>
   <p:sldSz cx="12192000" cy="6858000"/>
   <p:notesSz cx="6858000" cy="9144000"/>
@@ -114,6 +117,11 @@
       </a:defRPr>
     </a:lvl9pPr>
   </p:defaultTextStyle>
+  <p:extLst>
+    <p:ext uri="{EFAFB233-063F-42B5-8137-9DF3F51BA10A}">
+      <p15:sldGuideLst xmlns:p15="http://schemas.microsoft.com/office/powerpoint/2012/main"/>
+    </p:ext>
+  </p:extLst>
 </p:presentation>
 </file>
 
@@ -2986,7 +2994,7 @@
         </p:nvSpPr>
         <p:spPr>
           <a:xfrm>
-            <a:off x="1404470" y="2187388"/>
+            <a:off x="1757082" y="2223247"/>
             <a:ext cx="9144000" cy="910198"/>
           </a:xfrm>
         </p:spPr>
@@ -3026,7 +3034,7 @@
         </p:nvSpPr>
         <p:spPr>
           <a:xfrm>
-            <a:off x="1404470" y="3097586"/>
+            <a:off x="1757082" y="3372504"/>
             <a:ext cx="9144000" cy="497821"/>
           </a:xfrm>
         </p:spPr>
@@ -3052,6 +3060,13 @@
   <p:clrMapOvr>
     <a:masterClrMapping/>
   </p:clrMapOvr>
+  <p:timing>
+    <p:tnLst>
+      <p:par>
+        <p:cTn id="1" dur="indefinite" restart="never" nodeType="tmRoot"/>
+      </p:par>
+    </p:tnLst>
+  </p:timing>
 </p:sld>
 </file>
 
@@ -3084,8 +3099,8 @@
         </p:nvSpPr>
         <p:spPr>
           <a:xfrm>
-            <a:off x="3059953" y="383054"/>
-            <a:ext cx="6072094" cy="1325563"/>
+            <a:off x="838200" y="215713"/>
+            <a:ext cx="10515600" cy="782357"/>
           </a:xfrm>
         </p:spPr>
         <p:txBody>
@@ -3096,7 +3111,7 @@
               <a:rPr lang="pl-PL" dirty="0" smtClean="0">
                 <a:latin typeface="+mn-lt"/>
               </a:rPr>
-              <a:t>Fragmenty kodu bibliotek</a:t>
+              <a:t>	Realizacja w języku wysokiego poziomu</a:t>
             </a:r>
             <a:endParaRPr lang="pl-PL" dirty="0">
               <a:latin typeface="+mn-lt"/>
@@ -3126,7 +3141,148 @@
         </p:blipFill>
         <p:spPr>
           <a:xfrm>
-            <a:off x="5856941" y="1981427"/>
+            <a:off x="1694037" y="1658005"/>
+            <a:ext cx="8803926" cy="4356503"/>
+          </a:xfrm>
+          <a:prstGeom prst="rect">
+            <a:avLst/>
+          </a:prstGeom>
+        </p:spPr>
+      </p:pic>
+      <p:sp>
+        <p:nvSpPr>
+          <p:cNvPr id="5" name="pole tekstowe 4"/>
+          <p:cNvSpPr txBox="1"/>
+          <p:nvPr/>
+        </p:nvSpPr>
+        <p:spPr>
+          <a:xfrm>
+            <a:off x="3804315" y="866589"/>
+            <a:ext cx="6693648" cy="369332"/>
+          </a:xfrm>
+          <a:prstGeom prst="rect">
+            <a:avLst/>
+          </a:prstGeom>
+          <a:noFill/>
+        </p:spPr>
+        <p:txBody>
+          <a:bodyPr wrap="square" rtlCol="0">
+            <a:spAutoFit/>
+          </a:bodyPr>
+          <a:lstStyle/>
+          <a:p>
+            <a:r>
+              <a:rPr lang="pl-PL" dirty="0" smtClean="0"/>
+              <a:t>Najważniejsza funkcja zaimplementowana w C#</a:t>
+            </a:r>
+            <a:endParaRPr lang="pl-PL" dirty="0"/>
+          </a:p>
+        </p:txBody>
+      </p:sp>
+    </p:spTree>
+    <p:extLst>
+      <p:ext uri="{BB962C8B-B14F-4D97-AF65-F5344CB8AC3E}">
+        <p14:creationId xmlns:p14="http://schemas.microsoft.com/office/powerpoint/2010/main" val="2667596771"/>
+      </p:ext>
+    </p:extLst>
+  </p:cSld>
+  <p:clrMapOvr>
+    <a:masterClrMapping/>
+  </p:clrMapOvr>
+  <p:timing>
+    <p:tnLst>
+      <p:par>
+        <p:cTn id="1" dur="indefinite" restart="never" nodeType="tmRoot"/>
+      </p:par>
+    </p:tnLst>
+  </p:timing>
+</p:sld>
+</file>
+
+<file path=ppt/slides/slide11.xml><?xml version="1.0" encoding="utf-8"?>
+<p:sld xmlns:a="http://schemas.openxmlformats.org/drawingml/2006/main" xmlns:r="http://schemas.openxmlformats.org/officeDocument/2006/relationships" xmlns:p="http://schemas.openxmlformats.org/presentationml/2006/main">
+  <p:cSld>
+    <p:spTree>
+      <p:nvGrpSpPr>
+        <p:cNvPr id="1" name=""/>
+        <p:cNvGrpSpPr/>
+        <p:nvPr/>
+      </p:nvGrpSpPr>
+      <p:grpSpPr>
+        <a:xfrm>
+          <a:off x="0" y="0"/>
+          <a:ext cx="0" cy="0"/>
+          <a:chOff x="0" y="0"/>
+          <a:chExt cx="0" cy="0"/>
+        </a:xfrm>
+      </p:grpSpPr>
+      <p:sp>
+        <p:nvSpPr>
+          <p:cNvPr id="2" name="Tytuł 1"/>
+          <p:cNvSpPr>
+            <a:spLocks noGrp="1"/>
+          </p:cNvSpPr>
+          <p:nvPr>
+            <p:ph type="title"/>
+          </p:nvPr>
+        </p:nvSpPr>
+        <p:spPr>
+          <a:xfrm>
+            <a:off x="2631685" y="60829"/>
+            <a:ext cx="6615953" cy="1325563"/>
+          </a:xfrm>
+        </p:spPr>
+        <p:txBody>
+          <a:bodyPr/>
+          <a:lstStyle/>
+          <a:p>
+            <a:r>
+              <a:rPr lang="pl-PL" dirty="0" smtClean="0">
+                <a:latin typeface="+mn-lt"/>
+              </a:rPr>
+              <a:t>Relacja </a:t>
+            </a:r>
+            <a:r>
+              <a:rPr lang="pl-PL" dirty="0" err="1" smtClean="0">
+                <a:latin typeface="+mn-lt"/>
+              </a:rPr>
+              <a:t>wysoki-niski</a:t>
+            </a:r>
+            <a:r>
+              <a:rPr lang="pl-PL" dirty="0" smtClean="0">
+                <a:latin typeface="+mn-lt"/>
+              </a:rPr>
+              <a:t> poziom</a:t>
+            </a:r>
+            <a:endParaRPr lang="pl-PL" dirty="0">
+              <a:latin typeface="+mn-lt"/>
+            </a:endParaRPr>
+          </a:p>
+        </p:txBody>
+      </p:sp>
+      <p:pic>
+        <p:nvPicPr>
+          <p:cNvPr id="4" name="Obraz 3"/>
+          <p:cNvPicPr>
+            <a:picLocks noChangeAspect="1"/>
+          </p:cNvPicPr>
+          <p:nvPr/>
+        </p:nvPicPr>
+        <p:blipFill>
+          <a:blip r:embed="rId2">
+            <a:extLst>
+              <a:ext uri="{28A0092B-C50C-407E-A947-70E740481C1C}">
+                <a14:useLocalDpi xmlns:a14="http://schemas.microsoft.com/office/drawing/2010/main" val="0"/>
+              </a:ext>
+            </a:extLst>
+          </a:blip>
+          <a:stretch>
+            <a:fillRect/>
+          </a:stretch>
+        </p:blipFill>
+        <p:spPr>
+          <a:xfrm>
+            <a:off x="5939663" y="1953629"/>
             <a:ext cx="5059249" cy="3621513"/>
           </a:xfrm>
           <a:prstGeom prst="rect">
@@ -3236,6 +3392,36 @@
           </a:fontRef>
         </p:style>
       </p:cxnSp>
+      <p:sp>
+        <p:nvSpPr>
+          <p:cNvPr id="6" name="pole tekstowe 5"/>
+          <p:cNvSpPr txBox="1"/>
+          <p:nvPr/>
+        </p:nvSpPr>
+        <p:spPr>
+          <a:xfrm>
+            <a:off x="3513214" y="1116012"/>
+            <a:ext cx="4852894" cy="369332"/>
+          </a:xfrm>
+          <a:prstGeom prst="rect">
+            <a:avLst/>
+          </a:prstGeom>
+          <a:noFill/>
+        </p:spPr>
+        <p:txBody>
+          <a:bodyPr wrap="square" rtlCol="0">
+            <a:spAutoFit/>
+          </a:bodyPr>
+          <a:lstStyle/>
+          <a:p>
+            <a:r>
+              <a:rPr lang="pl-PL" dirty="0" smtClean="0"/>
+              <a:t>Część funkcji zaimplementowanej w MASM x64</a:t>
+            </a:r>
+            <a:endParaRPr lang="pl-PL" dirty="0"/>
+          </a:p>
+        </p:txBody>
+      </p:sp>
     </p:spTree>
     <p:extLst>
       <p:ext uri="{BB962C8B-B14F-4D97-AF65-F5344CB8AC3E}">
@@ -3246,10 +3432,17 @@
   <p:clrMapOvr>
     <a:masterClrMapping/>
   </p:clrMapOvr>
+  <p:timing>
+    <p:tnLst>
+      <p:par>
+        <p:cTn id="1" dur="indefinite" restart="never" nodeType="tmRoot"/>
+      </p:par>
+    </p:tnLst>
+  </p:timing>
 </p:sld>
 </file>
 
-<file path=ppt/slides/slide11.xml><?xml version="1.0" encoding="utf-8"?>
+<file path=ppt/slides/slide12.xml><?xml version="1.0" encoding="utf-8"?>
 <p:sld xmlns:a="http://schemas.openxmlformats.org/drawingml/2006/main" xmlns:r="http://schemas.openxmlformats.org/officeDocument/2006/relationships" xmlns:p="http://schemas.openxmlformats.org/presentationml/2006/main">
   <p:cSld>
     <p:spTree>
@@ -3276,12 +3469,667 @@
             <p:ph type="title"/>
           </p:nvPr>
         </p:nvSpPr>
+        <p:spPr>
+          <a:xfrm>
+            <a:off x="838200" y="317314"/>
+            <a:ext cx="10515600" cy="818216"/>
+          </a:xfrm>
+        </p:spPr>
+        <p:txBody>
+          <a:bodyPr/>
+          <a:lstStyle/>
+          <a:p>
+            <a:r>
+              <a:rPr lang="pl-PL" dirty="0" smtClean="0">
+                <a:latin typeface="+mn-lt"/>
+              </a:rPr>
+              <a:t>			Zwiększanie możliwości  </a:t>
+            </a:r>
+            <a:endParaRPr lang="pl-PL" dirty="0">
+              <a:latin typeface="+mn-lt"/>
+            </a:endParaRPr>
+          </a:p>
+        </p:txBody>
+      </p:sp>
+      <p:sp>
+        <p:nvSpPr>
+          <p:cNvPr id="3" name="Symbol zastępczy zawartości 2"/>
+          <p:cNvSpPr>
+            <a:spLocks noGrp="1"/>
+          </p:cNvSpPr>
+          <p:nvPr>
+            <p:ph idx="1"/>
+          </p:nvPr>
+        </p:nvSpPr>
+        <p:spPr>
+          <a:xfrm>
+            <a:off x="3623235" y="1135530"/>
+            <a:ext cx="5544671" cy="481293"/>
+          </a:xfrm>
+        </p:spPr>
+        <p:txBody>
+          <a:bodyPr/>
+          <a:lstStyle/>
+          <a:p>
+            <a:pPr marL="0" indent="0">
+              <a:buNone/>
+            </a:pPr>
+            <a:r>
+              <a:rPr lang="pl-PL" dirty="0" smtClean="0"/>
+              <a:t>Obszarowy </a:t>
+            </a:r>
+            <a:r>
+              <a:rPr lang="pl-PL" dirty="0"/>
+              <a:t>parametr podobieństwa</a:t>
+            </a:r>
+          </a:p>
+        </p:txBody>
+      </p:sp>
+      <p:pic>
+        <p:nvPicPr>
+          <p:cNvPr id="5" name="Obraz 4"/>
+          <p:cNvPicPr>
+            <a:picLocks noChangeAspect="1"/>
+          </p:cNvPicPr>
+          <p:nvPr/>
+        </p:nvPicPr>
+        <p:blipFill>
+          <a:blip r:embed="rId2">
+            <a:extLst>
+              <a:ext uri="{28A0092B-C50C-407E-A947-70E740481C1C}">
+                <a14:useLocalDpi xmlns:a14="http://schemas.microsoft.com/office/drawing/2010/main" val="0"/>
+              </a:ext>
+            </a:extLst>
+          </a:blip>
+          <a:stretch>
+            <a:fillRect/>
+          </a:stretch>
+        </p:blipFill>
+        <p:spPr>
+          <a:xfrm>
+            <a:off x="838200" y="3802072"/>
+            <a:ext cx="2510103" cy="2554141"/>
+          </a:xfrm>
+          <a:prstGeom prst="rect">
+            <a:avLst/>
+          </a:prstGeom>
+        </p:spPr>
+      </p:pic>
+      <p:pic>
+        <p:nvPicPr>
+          <p:cNvPr id="6" name="Obraz 5"/>
+          <p:cNvPicPr>
+            <a:picLocks noChangeAspect="1"/>
+          </p:cNvPicPr>
+          <p:nvPr/>
+        </p:nvPicPr>
+        <p:blipFill>
+          <a:blip r:embed="rId3">
+            <a:extLst>
+              <a:ext uri="{28A0092B-C50C-407E-A947-70E740481C1C}">
+                <a14:useLocalDpi xmlns:a14="http://schemas.microsoft.com/office/drawing/2010/main" val="0"/>
+              </a:ext>
+            </a:extLst>
+          </a:blip>
+          <a:stretch>
+            <a:fillRect/>
+          </a:stretch>
+        </p:blipFill>
+        <p:spPr>
+          <a:xfrm>
+            <a:off x="9167906" y="3802072"/>
+            <a:ext cx="2514956" cy="2565892"/>
+          </a:xfrm>
+          <a:prstGeom prst="rect">
+            <a:avLst/>
+          </a:prstGeom>
+        </p:spPr>
+      </p:pic>
+      <p:cxnSp>
+        <p:nvCxnSpPr>
+          <p:cNvPr id="8" name="Łącznik prosty ze strzałką 7"/>
+          <p:cNvCxnSpPr/>
+          <p:nvPr/>
+        </p:nvCxnSpPr>
+        <p:spPr>
+          <a:xfrm>
+            <a:off x="3567953" y="5079142"/>
+            <a:ext cx="1219200" cy="0"/>
+          </a:xfrm>
+          <a:prstGeom prst="straightConnector1">
+            <a:avLst/>
+          </a:prstGeom>
+          <a:ln>
+            <a:solidFill>
+              <a:schemeClr val="tx1"/>
+            </a:solidFill>
+            <a:tailEnd type="triangle"/>
+          </a:ln>
+        </p:spPr>
+        <p:style>
+          <a:lnRef idx="1">
+            <a:schemeClr val="accent1"/>
+          </a:lnRef>
+          <a:fillRef idx="0">
+            <a:schemeClr val="accent1"/>
+          </a:fillRef>
+          <a:effectRef idx="0">
+            <a:schemeClr val="accent1"/>
+          </a:effectRef>
+          <a:fontRef idx="minor">
+            <a:schemeClr val="tx1"/>
+          </a:fontRef>
+        </p:style>
+      </p:cxnSp>
+      <p:cxnSp>
+        <p:nvCxnSpPr>
+          <p:cNvPr id="10" name="Łącznik prosty ze strzałką 9"/>
+          <p:cNvCxnSpPr/>
+          <p:nvPr/>
+        </p:nvCxnSpPr>
+        <p:spPr>
+          <a:xfrm flipH="1">
+            <a:off x="7667812" y="5079142"/>
+            <a:ext cx="1219200" cy="0"/>
+          </a:xfrm>
+          <a:prstGeom prst="straightConnector1">
+            <a:avLst/>
+          </a:prstGeom>
+          <a:ln>
+            <a:solidFill>
+              <a:schemeClr val="tx1"/>
+            </a:solidFill>
+            <a:tailEnd type="triangle"/>
+          </a:ln>
+        </p:spPr>
+        <p:style>
+          <a:lnRef idx="1">
+            <a:schemeClr val="accent1"/>
+          </a:lnRef>
+          <a:fillRef idx="0">
+            <a:schemeClr val="accent1"/>
+          </a:fillRef>
+          <a:effectRef idx="0">
+            <a:schemeClr val="accent1"/>
+          </a:effectRef>
+          <a:fontRef idx="minor">
+            <a:schemeClr val="tx1"/>
+          </a:fontRef>
+        </p:style>
+      </p:cxnSp>
+      <p:sp>
+        <p:nvSpPr>
+          <p:cNvPr id="11" name="pole tekstowe 10"/>
+          <p:cNvSpPr txBox="1"/>
+          <p:nvPr/>
+        </p:nvSpPr>
+        <p:spPr>
+          <a:xfrm>
+            <a:off x="5940612" y="4434541"/>
+            <a:ext cx="573740" cy="1200329"/>
+          </a:xfrm>
+          <a:prstGeom prst="rect">
+            <a:avLst/>
+          </a:prstGeom>
+          <a:noFill/>
+        </p:spPr>
+        <p:txBody>
+          <a:bodyPr wrap="square" rtlCol="0">
+            <a:spAutoFit/>
+          </a:bodyPr>
+          <a:lstStyle/>
+          <a:p>
+            <a:r>
+              <a:rPr lang="pl-PL" sz="7200" dirty="0" smtClean="0"/>
+              <a:t>?</a:t>
+            </a:r>
+            <a:endParaRPr lang="pl-PL" sz="7200" dirty="0"/>
+          </a:p>
+        </p:txBody>
+      </p:sp>
+      <p:sp>
+        <p:nvSpPr>
+          <p:cNvPr id="12" name="pole tekstowe 11"/>
+          <p:cNvSpPr txBox="1"/>
+          <p:nvPr/>
+        </p:nvSpPr>
+        <p:spPr>
+          <a:xfrm>
+            <a:off x="838200" y="2149384"/>
+            <a:ext cx="9991165" cy="646331"/>
+          </a:xfrm>
+          <a:prstGeom prst="rect">
+            <a:avLst/>
+          </a:prstGeom>
+          <a:noFill/>
+        </p:spPr>
+        <p:txBody>
+          <a:bodyPr wrap="square" rtlCol="0">
+            <a:spAutoFit/>
+          </a:bodyPr>
+          <a:lstStyle/>
+          <a:p>
+            <a:pPr marL="285750" indent="-285750">
+              <a:buFont typeface="Arial" panose="020B0604020202020204" pitchFamily="34" charset="0"/>
+              <a:buChar char="•"/>
+            </a:pPr>
+            <a:r>
+              <a:rPr lang="pl-PL" dirty="0" smtClean="0"/>
+              <a:t>Parametr nie jeden dla całego obrazu a określany dla obszarów</a:t>
+            </a:r>
+          </a:p>
+          <a:p>
+            <a:pPr marL="285750" indent="-285750">
+              <a:buFont typeface="Arial" panose="020B0604020202020204" pitchFamily="34" charset="0"/>
+              <a:buChar char="•"/>
+            </a:pPr>
+            <a:r>
+              <a:rPr lang="pl-PL" dirty="0" smtClean="0"/>
+              <a:t>Kolejna warstwa punktów charakterystycznych ale określanych tylko na jednym obrazie</a:t>
+            </a:r>
+            <a:endParaRPr lang="pl-PL" dirty="0"/>
+          </a:p>
+        </p:txBody>
+      </p:sp>
+    </p:spTree>
+    <p:extLst>
+      <p:ext uri="{BB962C8B-B14F-4D97-AF65-F5344CB8AC3E}">
+        <p14:creationId xmlns:p14="http://schemas.microsoft.com/office/powerpoint/2010/main" val="3990384847"/>
+      </p:ext>
+    </p:extLst>
+  </p:cSld>
+  <p:clrMapOvr>
+    <a:masterClrMapping/>
+  </p:clrMapOvr>
+  <p:timing>
+    <p:tnLst>
+      <p:par>
+        <p:cTn id="1" dur="indefinite" restart="never" nodeType="tmRoot"/>
+      </p:par>
+    </p:tnLst>
+  </p:timing>
+</p:sld>
+</file>
+
+<file path=ppt/slides/slide13.xml><?xml version="1.0" encoding="utf-8"?>
+<p:sld xmlns:a="http://schemas.openxmlformats.org/drawingml/2006/main" xmlns:r="http://schemas.openxmlformats.org/officeDocument/2006/relationships" xmlns:p="http://schemas.openxmlformats.org/presentationml/2006/main">
+  <p:cSld>
+    <p:spTree>
+      <p:nvGrpSpPr>
+        <p:cNvPr id="1" name=""/>
+        <p:cNvGrpSpPr/>
+        <p:nvPr/>
+      </p:nvGrpSpPr>
+      <p:grpSpPr>
+        <a:xfrm>
+          <a:off x="0" y="0"/>
+          <a:ext cx="0" cy="0"/>
+          <a:chOff x="0" y="0"/>
+          <a:chExt cx="0" cy="0"/>
+        </a:xfrm>
+      </p:grpSpPr>
+      <p:sp>
+        <p:nvSpPr>
+          <p:cNvPr id="2" name="Tytuł 1"/>
+          <p:cNvSpPr>
+            <a:spLocks noGrp="1"/>
+          </p:cNvSpPr>
+          <p:nvPr>
+            <p:ph type="title"/>
+          </p:nvPr>
+        </p:nvSpPr>
+        <p:spPr>
+          <a:xfrm>
+            <a:off x="1910228" y="418914"/>
+            <a:ext cx="8371541" cy="770404"/>
+          </a:xfrm>
+        </p:spPr>
+        <p:txBody>
+          <a:bodyPr>
+            <a:normAutofit fontScale="90000"/>
+          </a:bodyPr>
+          <a:lstStyle/>
+          <a:p>
+            <a:r>
+              <a:rPr lang="pl-PL" dirty="0" smtClean="0">
+                <a:latin typeface="+mn-lt"/>
+              </a:rPr>
+              <a:t>   Obszarowy </a:t>
+            </a:r>
+            <a:r>
+              <a:rPr lang="pl-PL" dirty="0">
+                <a:latin typeface="+mn-lt"/>
+              </a:rPr>
+              <a:t>parametr podobieństwa</a:t>
+            </a:r>
+            <a:r>
+              <a:rPr lang="pl-PL" dirty="0"/>
+              <a:t/>
+            </a:r>
+            <a:br>
+              <a:rPr lang="pl-PL" dirty="0"/>
+            </a:br>
+            <a:endParaRPr lang="pl-PL" dirty="0"/>
+          </a:p>
+        </p:txBody>
+      </p:sp>
+      <p:sp>
+        <p:nvSpPr>
+          <p:cNvPr id="3" name="Symbol zastępczy zawartości 2"/>
+          <p:cNvSpPr>
+            <a:spLocks noGrp="1"/>
+          </p:cNvSpPr>
+          <p:nvPr>
+            <p:ph idx="1"/>
+          </p:nvPr>
+        </p:nvSpPr>
+        <p:spPr>
+          <a:xfrm>
+            <a:off x="3615765" y="954648"/>
+            <a:ext cx="6508376" cy="469340"/>
+          </a:xfrm>
+        </p:spPr>
+        <p:txBody>
+          <a:bodyPr>
+            <a:normAutofit lnSpcReduction="10000"/>
+          </a:bodyPr>
+          <a:lstStyle/>
+          <a:p>
+            <a:pPr marL="0" indent="0">
+              <a:buNone/>
+            </a:pPr>
+            <a:r>
+              <a:rPr lang="pl-PL" dirty="0" smtClean="0"/>
+              <a:t>Działanie i miejsce w programie</a:t>
+            </a:r>
+            <a:endParaRPr lang="pl-PL" dirty="0"/>
+          </a:p>
+        </p:txBody>
+      </p:sp>
+      <p:sp>
+        <p:nvSpPr>
+          <p:cNvPr id="4" name="pole tekstowe 3"/>
+          <p:cNvSpPr txBox="1"/>
+          <p:nvPr/>
+        </p:nvSpPr>
+        <p:spPr>
+          <a:xfrm>
+            <a:off x="729130" y="2008094"/>
+            <a:ext cx="10733743" cy="3970318"/>
+          </a:xfrm>
+          <a:prstGeom prst="rect">
+            <a:avLst/>
+          </a:prstGeom>
+          <a:noFill/>
+        </p:spPr>
+        <p:txBody>
+          <a:bodyPr wrap="square" rtlCol="0">
+            <a:spAutoFit/>
+          </a:bodyPr>
+          <a:lstStyle/>
+          <a:p>
+            <a:r>
+              <a:rPr lang="pl-PL" dirty="0" err="1"/>
+              <a:t>v</a:t>
+            </a:r>
+            <a:r>
+              <a:rPr lang="pl-PL" dirty="0" err="1" smtClean="0"/>
+              <a:t>oid</a:t>
+            </a:r>
+            <a:r>
+              <a:rPr lang="pl-PL" dirty="0" smtClean="0"/>
+              <a:t> </a:t>
+            </a:r>
+            <a:r>
+              <a:rPr lang="pl-PL" dirty="0" err="1" smtClean="0"/>
+              <a:t>morphingAlgorithm</a:t>
+            </a:r>
+            <a:endParaRPr lang="pl-PL" dirty="0" smtClean="0"/>
+          </a:p>
+          <a:p>
+            <a:r>
+              <a:rPr lang="pl-PL" dirty="0" smtClean="0"/>
+              <a:t>{</a:t>
+            </a:r>
+          </a:p>
+          <a:p>
+            <a:r>
+              <a:rPr lang="pl-PL" dirty="0" smtClean="0"/>
+              <a:t>	for </a:t>
+            </a:r>
+            <a:r>
+              <a:rPr lang="pl-PL" dirty="0"/>
+              <a:t>(i = 0; i </a:t>
+            </a:r>
+            <a:r>
+              <a:rPr lang="pl-PL" dirty="0" smtClean="0"/>
+              <a:t>&lt; </a:t>
+            </a:r>
+            <a:r>
+              <a:rPr lang="pl-PL" dirty="0" err="1" smtClean="0"/>
+              <a:t>imageHeight</a:t>
+            </a:r>
+            <a:r>
+              <a:rPr lang="pl-PL" dirty="0" smtClean="0"/>
+              <a:t>; </a:t>
+            </a:r>
+            <a:r>
+              <a:rPr lang="pl-PL" dirty="0"/>
+              <a:t>i++)</a:t>
+            </a:r>
+          </a:p>
+          <a:p>
+            <a:r>
+              <a:rPr lang="pl-PL" dirty="0" smtClean="0"/>
+              <a:t>	{</a:t>
+            </a:r>
+            <a:endParaRPr lang="pl-PL" dirty="0"/>
+          </a:p>
+          <a:p>
+            <a:r>
+              <a:rPr lang="pl-PL" dirty="0"/>
+              <a:t>	</a:t>
+            </a:r>
+            <a:r>
+              <a:rPr lang="pl-PL" dirty="0" smtClean="0"/>
+              <a:t>	for(j </a:t>
+            </a:r>
+            <a:r>
+              <a:rPr lang="pl-PL" dirty="0"/>
+              <a:t>= 0; j &lt; </a:t>
+            </a:r>
+            <a:r>
+              <a:rPr lang="pl-PL" dirty="0" err="1" smtClean="0"/>
+              <a:t>imageWidth</a:t>
+            </a:r>
+            <a:r>
+              <a:rPr lang="pl-PL" dirty="0" smtClean="0"/>
+              <a:t>; </a:t>
+            </a:r>
+            <a:r>
+              <a:rPr lang="pl-PL" dirty="0"/>
+              <a:t>j++)</a:t>
+            </a:r>
+          </a:p>
+          <a:p>
+            <a:r>
+              <a:rPr lang="pl-PL" dirty="0"/>
+              <a:t>	</a:t>
+            </a:r>
+            <a:r>
+              <a:rPr lang="pl-PL" dirty="0" smtClean="0"/>
+              <a:t>	{</a:t>
+            </a:r>
+            <a:endParaRPr lang="pl-PL" dirty="0"/>
+          </a:p>
+          <a:p>
+            <a:r>
+              <a:rPr lang="pl-PL" dirty="0"/>
+              <a:t>		</a:t>
+            </a:r>
+            <a:r>
+              <a:rPr lang="pl-PL" dirty="0" smtClean="0"/>
+              <a:t>	</a:t>
+            </a:r>
+            <a:r>
+              <a:rPr lang="pl-PL" dirty="0" err="1" smtClean="0"/>
+              <a:t>charPoint</a:t>
+            </a:r>
+            <a:r>
+              <a:rPr lang="pl-PL" dirty="0" smtClean="0"/>
+              <a:t> = </a:t>
+            </a:r>
+            <a:r>
+              <a:rPr lang="pl-PL" dirty="0" err="1" smtClean="0"/>
+              <a:t>findNearestLambdaCharPoint</a:t>
+            </a:r>
+            <a:r>
+              <a:rPr lang="pl-PL" dirty="0" smtClean="0"/>
+              <a:t> (i, j)</a:t>
+            </a:r>
+          </a:p>
+          <a:p>
+            <a:r>
+              <a:rPr lang="pl-PL" dirty="0"/>
+              <a:t>	</a:t>
+            </a:r>
+            <a:r>
+              <a:rPr lang="pl-PL" dirty="0" smtClean="0"/>
+              <a:t>		</a:t>
+            </a:r>
+            <a:r>
+              <a:rPr lang="pl-PL" dirty="0" err="1" smtClean="0"/>
+              <a:t>setLambda</a:t>
+            </a:r>
+            <a:r>
+              <a:rPr lang="pl-PL" dirty="0" smtClean="0"/>
+              <a:t>(</a:t>
+            </a:r>
+            <a:r>
+              <a:rPr lang="pl-PL" dirty="0" err="1" smtClean="0"/>
+              <a:t>charPoint.Lambda</a:t>
+            </a:r>
+            <a:r>
+              <a:rPr lang="pl-PL" dirty="0" smtClean="0"/>
+              <a:t>)</a:t>
+            </a:r>
+          </a:p>
+          <a:p>
+            <a:r>
+              <a:rPr lang="pl-PL" dirty="0"/>
+              <a:t>	</a:t>
+            </a:r>
+            <a:r>
+              <a:rPr lang="pl-PL" dirty="0" smtClean="0"/>
+              <a:t>		//</a:t>
+            </a:r>
+            <a:r>
+              <a:rPr lang="pl-PL" dirty="0"/>
+              <a:t>Realizacja normalnej części algorytmu dla tego punktu ale przy </a:t>
+            </a:r>
+          </a:p>
+          <a:p>
+            <a:r>
+              <a:rPr lang="pl-PL" dirty="0" smtClean="0"/>
+              <a:t>			// </a:t>
+            </a:r>
+            <a:r>
+              <a:rPr lang="pl-PL" i="1" dirty="0" smtClean="0">
+                <a:ea typeface="Cambria Math" panose="02040503050406030204" pitchFamily="18" charset="0"/>
+              </a:rPr>
+              <a:t>l = Lambda</a:t>
+            </a:r>
+            <a:endParaRPr lang="pl-PL" dirty="0"/>
+          </a:p>
+          <a:p>
+            <a:r>
+              <a:rPr lang="pl-PL" dirty="0"/>
+              <a:t>	</a:t>
+            </a:r>
+            <a:r>
+              <a:rPr lang="pl-PL" dirty="0" smtClean="0"/>
+              <a:t>	}</a:t>
+            </a:r>
+            <a:endParaRPr lang="pl-PL" dirty="0"/>
+          </a:p>
+          <a:p>
+            <a:r>
+              <a:rPr lang="pl-PL" dirty="0" smtClean="0"/>
+              <a:t>	}</a:t>
+            </a:r>
+          </a:p>
+          <a:p>
+            <a:endParaRPr lang="pl-PL" dirty="0"/>
+          </a:p>
+          <a:p>
+            <a:r>
+              <a:rPr lang="pl-PL" dirty="0"/>
+              <a:t>}</a:t>
+            </a:r>
+          </a:p>
+        </p:txBody>
+      </p:sp>
+    </p:spTree>
+    <p:extLst>
+      <p:ext uri="{BB962C8B-B14F-4D97-AF65-F5344CB8AC3E}">
+        <p14:creationId xmlns:p14="http://schemas.microsoft.com/office/powerpoint/2010/main" val="3698146323"/>
+      </p:ext>
+    </p:extLst>
+  </p:cSld>
+  <p:clrMapOvr>
+    <a:masterClrMapping/>
+  </p:clrMapOvr>
+  <p:timing>
+    <p:tnLst>
+      <p:par>
+        <p:cTn id="1" dur="indefinite" restart="never" nodeType="tmRoot"/>
+      </p:par>
+    </p:tnLst>
+  </p:timing>
+</p:sld>
+</file>
+
+<file path=ppt/slides/slide14.xml><?xml version="1.0" encoding="utf-8"?>
+<p:sld xmlns:a="http://schemas.openxmlformats.org/drawingml/2006/main" xmlns:r="http://schemas.openxmlformats.org/officeDocument/2006/relationships" xmlns:p="http://schemas.openxmlformats.org/presentationml/2006/main">
+  <p:cSld>
+    <p:spTree>
+      <p:nvGrpSpPr>
+        <p:cNvPr id="1" name=""/>
+        <p:cNvGrpSpPr/>
+        <p:nvPr/>
+      </p:nvGrpSpPr>
+      <p:grpSpPr>
+        <a:xfrm>
+          <a:off x="0" y="0"/>
+          <a:ext cx="0" cy="0"/>
+          <a:chOff x="0" y="0"/>
+          <a:chExt cx="0" cy="0"/>
+        </a:xfrm>
+      </p:grpSpPr>
+      <p:sp>
+        <p:nvSpPr>
+          <p:cNvPr id="2" name="Tytuł 1"/>
+          <p:cNvSpPr>
+            <a:spLocks noGrp="1"/>
+          </p:cNvSpPr>
+          <p:nvPr>
+            <p:ph type="title"/>
+          </p:nvPr>
+        </p:nvSpPr>
         <p:spPr/>
         <p:txBody>
           <a:bodyPr/>
           <a:lstStyle/>
           <a:p>
-            <a:endParaRPr lang="pl-PL"/>
+            <a:r>
+              <a:rPr lang="pl-PL" dirty="0" smtClean="0">
+                <a:latin typeface="+mn-lt"/>
+              </a:rPr>
+              <a:t>			Aktualny stan prac</a:t>
+            </a:r>
+            <a:endParaRPr lang="pl-PL" dirty="0">
+              <a:latin typeface="+mn-lt"/>
+            </a:endParaRPr>
           </a:p>
         </p:txBody>
       </p:sp>
@@ -3314,6 +4162,13 @@
   <p:clrMapOvr>
     <a:masterClrMapping/>
   </p:clrMapOvr>
+  <p:timing>
+    <p:tnLst>
+      <p:par>
+        <p:cTn id="1" dur="indefinite" restart="never" nodeType="tmRoot"/>
+      </p:par>
+    </p:tnLst>
+  </p:timing>
 </p:sld>
 </file>
 
@@ -3346,7 +4201,7 @@
         </p:nvSpPr>
         <p:spPr>
           <a:xfrm>
-            <a:off x="838200" y="185270"/>
+            <a:off x="838200" y="179293"/>
             <a:ext cx="10515600" cy="1027300"/>
           </a:xfrm>
         </p:spPr>
@@ -3430,6 +4285,13 @@
   <p:clrMapOvr>
     <a:masterClrMapping/>
   </p:clrMapOvr>
+  <p:timing>
+    <p:tnLst>
+      <p:par>
+        <p:cTn id="1" dur="indefinite" restart="never" nodeType="tmRoot"/>
+      </p:par>
+    </p:tnLst>
+  </p:timing>
 </p:sld>
 </file>
 
@@ -3622,6 +4484,13 @@
   <p:clrMapOvr>
     <a:masterClrMapping/>
   </p:clrMapOvr>
+  <p:timing>
+    <p:tnLst>
+      <p:par>
+        <p:cTn id="1" dur="indefinite" restart="never" nodeType="tmRoot"/>
+      </p:par>
+    </p:tnLst>
+  </p:timing>
 </p:sld>
 </file>
 
@@ -4220,6 +5089,13 @@
   <p:clrMapOvr>
     <a:masterClrMapping/>
   </p:clrMapOvr>
+  <p:timing>
+    <p:tnLst>
+      <p:par>
+        <p:cTn id="1" dur="indefinite" restart="never" nodeType="tmRoot"/>
+      </p:par>
+    </p:tnLst>
+  </p:timing>
 </p:sld>
 </file>
 
@@ -4550,6 +5426,13 @@
   <p:clrMapOvr>
     <a:masterClrMapping/>
   </p:clrMapOvr>
+  <p:timing>
+    <p:tnLst>
+      <p:par>
+        <p:cTn id="1" dur="indefinite" restart="never" nodeType="tmRoot"/>
+      </p:par>
+    </p:tnLst>
+  </p:timing>
 </p:sld>
 </file>
 
@@ -4626,7 +5509,7 @@
         </p:blipFill>
         <p:spPr>
           <a:xfrm>
-            <a:off x="3730671" y="2821191"/>
+            <a:off x="3675529" y="2329074"/>
             <a:ext cx="4551364" cy="3034243"/>
           </a:xfrm>
           <a:prstGeom prst="rect">
@@ -4766,49 +5649,251 @@
           </a:fontRef>
         </p:style>
       </p:cxnSp>
-      <p:sp>
-        <p:nvSpPr>
-          <p:cNvPr id="12" name="pole tekstowe 11"/>
-          <p:cNvSpPr txBox="1"/>
-          <p:nvPr/>
-        </p:nvSpPr>
-        <p:spPr>
-          <a:xfrm>
-            <a:off x="5570070" y="2370280"/>
-            <a:ext cx="872565" cy="369332"/>
-          </a:xfrm>
-          <a:prstGeom prst="rect">
-            <a:avLst/>
-          </a:prstGeom>
-          <a:noFill/>
-        </p:spPr>
-        <p:txBody>
-          <a:bodyPr wrap="square" rtlCol="0">
-            <a:spAutoFit/>
-          </a:bodyPr>
-          <a:lstStyle/>
-          <a:p>
-            <a:r>
-              <a:rPr lang="pl-PL" i="1" dirty="0">
-                <a:latin typeface="Cambria Math" panose="02040503050406030204" pitchFamily="18" charset="0"/>
-                <a:ea typeface="Cambria Math" panose="02040503050406030204" pitchFamily="18" charset="0"/>
-              </a:rPr>
-              <a:t>l</a:t>
-            </a:r>
-            <a:r>
-              <a:rPr lang="pl-PL" i="1" dirty="0" smtClean="0">
-                <a:latin typeface="Cambria Math" panose="02040503050406030204" pitchFamily="18" charset="0"/>
-                <a:ea typeface="Cambria Math" panose="02040503050406030204" pitchFamily="18" charset="0"/>
-              </a:rPr>
-              <a:t> = 0.6</a:t>
-            </a:r>
-            <a:endParaRPr lang="pl-PL" i="1" dirty="0">
-              <a:latin typeface="Cambria Math" panose="02040503050406030204" pitchFamily="18" charset="0"/>
-              <a:ea typeface="Cambria Math" panose="02040503050406030204" pitchFamily="18" charset="0"/>
-            </a:endParaRPr>
-          </a:p>
-        </p:txBody>
-      </p:sp>
+      <mc:AlternateContent xmlns:mc="http://schemas.openxmlformats.org/markup-compatibility/2006">
+        <mc:Choice xmlns:a14="http://schemas.microsoft.com/office/drawing/2010/main" Requires="a14">
+          <p:sp>
+            <p:nvSpPr>
+              <p:cNvPr id="12" name="pole tekstowe 11"/>
+              <p:cNvSpPr txBox="1"/>
+              <p:nvPr/>
+            </p:nvSpPr>
+            <p:spPr>
+              <a:xfrm>
+                <a:off x="1894541" y="5939288"/>
+                <a:ext cx="8737601" cy="646331"/>
+              </a:xfrm>
+              <a:prstGeom prst="rect">
+                <a:avLst/>
+              </a:prstGeom>
+              <a:noFill/>
+            </p:spPr>
+            <p:txBody>
+              <a:bodyPr wrap="square" rtlCol="0">
+                <a:spAutoFit/>
+              </a:bodyPr>
+              <a:lstStyle/>
+              <a:p>
+                <a14:m>
+                  <m:oMathPara xmlns:m="http://schemas.openxmlformats.org/officeDocument/2006/math">
+                    <m:oMathParaPr>
+                      <m:jc m:val="centerGroup"/>
+                    </m:oMathParaPr>
+                    <m:oMath xmlns:m="http://schemas.openxmlformats.org/officeDocument/2006/math">
+                      <m:r>
+                        <a:rPr lang="pl-PL" b="0" i="1" smtClean="0">
+                          <a:latin typeface="Cambria Math" panose="02040503050406030204" pitchFamily="18" charset="0"/>
+                          <a:ea typeface="Cambria Math" panose="02040503050406030204" pitchFamily="18" charset="0"/>
+                        </a:rPr>
+                        <m:t>𝑐h𝑎𝑟𝑃𝑜𝑖𝑛𝑡𝑠𝑂𝑢𝑡𝑝𝑢𝑡</m:t>
+                      </m:r>
+                      <m:d>
+                        <m:dPr>
+                          <m:begChr m:val="["/>
+                          <m:endChr m:val="]"/>
+                          <m:ctrlPr>
+                            <a:rPr lang="pl-PL" b="0" i="1" smtClean="0">
+                              <a:latin typeface="Cambria Math" panose="02040503050406030204" pitchFamily="18" charset="0"/>
+                              <a:ea typeface="Cambria Math" panose="02040503050406030204" pitchFamily="18" charset="0"/>
+                            </a:rPr>
+                          </m:ctrlPr>
+                        </m:dPr>
+                        <m:e>
+                          <m:r>
+                            <a:rPr lang="pl-PL" b="0" i="1" smtClean="0">
+                              <a:latin typeface="Cambria Math" panose="02040503050406030204" pitchFamily="18" charset="0"/>
+                              <a:ea typeface="Cambria Math" panose="02040503050406030204" pitchFamily="18" charset="0"/>
+                            </a:rPr>
+                            <m:t>𝑖</m:t>
+                          </m:r>
+                        </m:e>
+                      </m:d>
+                      <m:r>
+                        <a:rPr lang="pl-PL" b="0" i="1" smtClean="0">
+                          <a:latin typeface="Cambria Math" panose="02040503050406030204" pitchFamily="18" charset="0"/>
+                          <a:ea typeface="Cambria Math" panose="02040503050406030204" pitchFamily="18" charset="0"/>
+                        </a:rPr>
+                        <m:t>=</m:t>
+                      </m:r>
+                      <m:r>
+                        <a:rPr lang="pl-PL" b="0" i="1" smtClean="0">
+                          <a:latin typeface="Cambria Math" panose="02040503050406030204" pitchFamily="18" charset="0"/>
+                          <a:ea typeface="Cambria Math" panose="02040503050406030204" pitchFamily="18" charset="0"/>
+                        </a:rPr>
+                        <m:t>𝑐h𝑎𝑟𝑃𝑜𝑖𝑛𝑡𝑠𝐹𝑖𝑟𝑠𝑡</m:t>
+                      </m:r>
+                      <m:d>
+                        <m:dPr>
+                          <m:begChr m:val="["/>
+                          <m:endChr m:val="]"/>
+                          <m:ctrlPr>
+                            <a:rPr lang="pl-PL" b="0" i="1" smtClean="0">
+                              <a:latin typeface="Cambria Math" panose="02040503050406030204" pitchFamily="18" charset="0"/>
+                              <a:ea typeface="Cambria Math" panose="02040503050406030204" pitchFamily="18" charset="0"/>
+                            </a:rPr>
+                          </m:ctrlPr>
+                        </m:dPr>
+                        <m:e>
+                          <m:r>
+                            <a:rPr lang="pl-PL" b="0" i="1" smtClean="0">
+                              <a:latin typeface="Cambria Math" panose="02040503050406030204" pitchFamily="18" charset="0"/>
+                              <a:ea typeface="Cambria Math" panose="02040503050406030204" pitchFamily="18" charset="0"/>
+                            </a:rPr>
+                            <m:t>𝑖</m:t>
+                          </m:r>
+                        </m:e>
+                      </m:d>
+                      <m:r>
+                        <a:rPr lang="pl-PL" b="0" i="1" smtClean="0">
+                          <a:latin typeface="Cambria Math" panose="02040503050406030204" pitchFamily="18" charset="0"/>
+                          <a:ea typeface="Cambria Math" panose="02040503050406030204" pitchFamily="18" charset="0"/>
+                        </a:rPr>
+                        <m:t>×</m:t>
+                      </m:r>
+                      <m:d>
+                        <m:dPr>
+                          <m:ctrlPr>
+                            <a:rPr lang="pl-PL" b="0" i="1" smtClean="0">
+                              <a:latin typeface="Cambria Math" panose="02040503050406030204" pitchFamily="18" charset="0"/>
+                              <a:ea typeface="Cambria Math" panose="02040503050406030204" pitchFamily="18" charset="0"/>
+                            </a:rPr>
+                          </m:ctrlPr>
+                        </m:dPr>
+                        <m:e>
+                          <m:r>
+                            <a:rPr lang="pl-PL" b="0" i="1" smtClean="0">
+                              <a:latin typeface="Cambria Math" panose="02040503050406030204" pitchFamily="18" charset="0"/>
+                              <a:ea typeface="Cambria Math" panose="02040503050406030204" pitchFamily="18" charset="0"/>
+                            </a:rPr>
+                            <m:t>1−</m:t>
+                          </m:r>
+                          <m:r>
+                            <a:rPr lang="pl-PL" b="0" i="1" smtClean="0">
+                              <a:latin typeface="Cambria Math" panose="02040503050406030204" pitchFamily="18" charset="0"/>
+                              <a:ea typeface="Cambria Math" panose="02040503050406030204" pitchFamily="18" charset="0"/>
+                            </a:rPr>
+                            <m:t>𝑙</m:t>
+                          </m:r>
+                        </m:e>
+                      </m:d>
+                      <m:r>
+                        <a:rPr lang="pl-PL" b="0" i="1" smtClean="0">
+                          <a:latin typeface="Cambria Math" panose="02040503050406030204" pitchFamily="18" charset="0"/>
+                          <a:ea typeface="Cambria Math" panose="02040503050406030204" pitchFamily="18" charset="0"/>
+                        </a:rPr>
+                        <m:t>+</m:t>
+                      </m:r>
+                      <m:r>
+                        <a:rPr lang="pl-PL" b="0" i="1" smtClean="0">
+                          <a:latin typeface="Cambria Math" panose="02040503050406030204" pitchFamily="18" charset="0"/>
+                          <a:ea typeface="Cambria Math" panose="02040503050406030204" pitchFamily="18" charset="0"/>
+                        </a:rPr>
+                        <m:t>𝑐h𝑎𝑟𝑃𝑜𝑖𝑛𝑡𝑠𝑆𝑒𝑐𝑜𝑛𝑑</m:t>
+                      </m:r>
+                      <m:d>
+                        <m:dPr>
+                          <m:begChr m:val="["/>
+                          <m:endChr m:val="]"/>
+                          <m:ctrlPr>
+                            <a:rPr lang="pl-PL" b="0" i="1" smtClean="0">
+                              <a:latin typeface="Cambria Math" panose="02040503050406030204" pitchFamily="18" charset="0"/>
+                              <a:ea typeface="Cambria Math" panose="02040503050406030204" pitchFamily="18" charset="0"/>
+                            </a:rPr>
+                          </m:ctrlPr>
+                        </m:dPr>
+                        <m:e>
+                          <m:r>
+                            <a:rPr lang="pl-PL" b="0" i="1" smtClean="0">
+                              <a:latin typeface="Cambria Math" panose="02040503050406030204" pitchFamily="18" charset="0"/>
+                              <a:ea typeface="Cambria Math" panose="02040503050406030204" pitchFamily="18" charset="0"/>
+                            </a:rPr>
+                            <m:t>𝑖</m:t>
+                          </m:r>
+                        </m:e>
+                      </m:d>
+                      <m:r>
+                        <a:rPr lang="pl-PL" b="0" i="1" smtClean="0">
+                          <a:latin typeface="Cambria Math" panose="02040503050406030204" pitchFamily="18" charset="0"/>
+                          <a:ea typeface="Cambria Math" panose="02040503050406030204" pitchFamily="18" charset="0"/>
+                        </a:rPr>
+                        <m:t>×</m:t>
+                      </m:r>
+                      <m:r>
+                        <a:rPr lang="pl-PL" b="0" i="1" smtClean="0">
+                          <a:latin typeface="Cambria Math" panose="02040503050406030204" pitchFamily="18" charset="0"/>
+                          <a:ea typeface="Cambria Math" panose="02040503050406030204" pitchFamily="18" charset="0"/>
+                        </a:rPr>
+                        <m:t>𝑙</m:t>
+                      </m:r>
+                      <m:r>
+                        <a:rPr lang="pl-PL" b="0" i="1" smtClean="0">
+                          <a:latin typeface="Cambria Math" panose="02040503050406030204" pitchFamily="18" charset="0"/>
+                          <a:ea typeface="Cambria Math" panose="02040503050406030204" pitchFamily="18" charset="0"/>
+                        </a:rPr>
+                        <m:t> </m:t>
+                      </m:r>
+                    </m:oMath>
+                  </m:oMathPara>
+                </a14:m>
+                <a:endParaRPr lang="pl-PL" i="1" dirty="0" smtClean="0">
+                  <a:latin typeface="Cambria Math" panose="02040503050406030204" pitchFamily="18" charset="0"/>
+                  <a:ea typeface="Cambria Math" panose="02040503050406030204" pitchFamily="18" charset="0"/>
+                </a:endParaRPr>
+              </a:p>
+              <a:p>
+                <a:r>
+                  <a:rPr lang="pl-PL" i="1" dirty="0" smtClean="0">
+                    <a:latin typeface="Cambria Math" panose="02040503050406030204" pitchFamily="18" charset="0"/>
+                    <a:ea typeface="Cambria Math" panose="02040503050406030204" pitchFamily="18" charset="0"/>
+                  </a:rPr>
+                  <a:t>			</a:t>
+                </a:r>
+                <a:endParaRPr lang="pl-PL" i="1" dirty="0">
+                  <a:latin typeface="Cambria Math" panose="02040503050406030204" pitchFamily="18" charset="0"/>
+                  <a:ea typeface="Cambria Math" panose="02040503050406030204" pitchFamily="18" charset="0"/>
+                </a:endParaRPr>
+              </a:p>
+            </p:txBody>
+          </p:sp>
+        </mc:Choice>
+        <mc:Fallback>
+          <p:sp>
+            <p:nvSpPr>
+              <p:cNvPr id="12" name="pole tekstowe 11"/>
+              <p:cNvSpPr txBox="1">
+                <a:spLocks noRot="1" noChangeAspect="1" noMove="1" noResize="1" noEditPoints="1" noAdjustHandles="1" noChangeArrowheads="1" noChangeShapeType="1" noTextEdit="1"/>
+              </p:cNvSpPr>
+              <p:nvPr/>
+            </p:nvSpPr>
+            <p:spPr>
+              <a:xfrm>
+                <a:off x="1894541" y="5939288"/>
+                <a:ext cx="8737601" cy="646331"/>
+              </a:xfrm>
+              <a:prstGeom prst="rect">
+                <a:avLst/>
+              </a:prstGeom>
+              <a:blipFill rotWithShape="0">
+                <a:blip r:embed="rId5"/>
+                <a:stretch>
+                  <a:fillRect/>
+                </a:stretch>
+              </a:blipFill>
+            </p:spPr>
+            <p:txBody>
+              <a:bodyPr/>
+              <a:lstStyle/>
+              <a:p>
+                <a:r>
+                  <a:rPr lang="pl-PL">
+                    <a:noFill/>
+                  </a:rPr>
+                  <a:t> </a:t>
+                </a:r>
+              </a:p>
+            </p:txBody>
+          </p:sp>
+        </mc:Fallback>
+      </mc:AlternateContent>
       <p:sp>
         <p:nvSpPr>
           <p:cNvPr id="13" name="pole tekstowe 12"/>
@@ -4860,7 +5945,7 @@
         </p:nvSpPr>
         <p:spPr>
           <a:xfrm>
-            <a:off x="4536141" y="6006353"/>
+            <a:off x="4442152" y="5500169"/>
             <a:ext cx="3018118" cy="369332"/>
           </a:xfrm>
           <a:prstGeom prst="rect">
@@ -4946,6 +6031,42 @@
               <a:t>[n]</a:t>
             </a:r>
             <a:endParaRPr lang="pl-PL" dirty="0">
+              <a:latin typeface="Cambria Math" panose="02040503050406030204" pitchFamily="18" charset="0"/>
+              <a:ea typeface="Cambria Math" panose="02040503050406030204" pitchFamily="18" charset="0"/>
+            </a:endParaRPr>
+          </a:p>
+        </p:txBody>
+      </p:sp>
+      <p:sp>
+        <p:nvSpPr>
+          <p:cNvPr id="3" name="pole tekstowe 2"/>
+          <p:cNvSpPr txBox="1"/>
+          <p:nvPr/>
+        </p:nvSpPr>
+        <p:spPr>
+          <a:xfrm>
+            <a:off x="5522258" y="1822890"/>
+            <a:ext cx="1482165" cy="369332"/>
+          </a:xfrm>
+          <a:prstGeom prst="rect">
+            <a:avLst/>
+          </a:prstGeom>
+          <a:noFill/>
+        </p:spPr>
+        <p:txBody>
+          <a:bodyPr wrap="square" rtlCol="0">
+            <a:spAutoFit/>
+          </a:bodyPr>
+          <a:lstStyle/>
+          <a:p>
+            <a:r>
+              <a:rPr lang="pl-PL" i="1" dirty="0" smtClean="0">
+                <a:latin typeface="Cambria Math" panose="02040503050406030204" pitchFamily="18" charset="0"/>
+                <a:ea typeface="Cambria Math" panose="02040503050406030204" pitchFamily="18" charset="0"/>
+              </a:rPr>
+              <a:t>l = 0.6</a:t>
+            </a:r>
+            <a:endParaRPr lang="pl-PL" i="1" dirty="0">
               <a:latin typeface="Cambria Math" panose="02040503050406030204" pitchFamily="18" charset="0"/>
               <a:ea typeface="Cambria Math" panose="02040503050406030204" pitchFamily="18" charset="0"/>
             </a:endParaRPr>
@@ -4962,6 +6083,13 @@
   <p:clrMapOvr>
     <a:masterClrMapping/>
   </p:clrMapOvr>
+  <p:timing>
+    <p:tnLst>
+      <p:par>
+        <p:cTn id="1" dur="indefinite" restart="never" nodeType="tmRoot"/>
+      </p:par>
+    </p:tnLst>
+  </p:timing>
 </p:sld>
 </file>
 
@@ -5009,8 +6137,8 @@
           </a:p>
         </p:txBody>
       </p:sp>
-      <mc:AlternateContent xmlns:mc="http://schemas.openxmlformats.org/markup-compatibility/2006">
-        <mc:Choice xmlns:a14="http://schemas.microsoft.com/office/drawing/2010/main" Requires="a14">
+      <mc:AlternateContent xmlns:mc="http://schemas.openxmlformats.org/markup-compatibility/2006" xmlns:a14="http://schemas.microsoft.com/office/drawing/2010/main">
+        <mc:Choice Requires="a14">
           <p:sp>
             <p:nvSpPr>
               <p:cNvPr id="3" name="Symbol zastępczy zawartości 2"/>
@@ -5127,7 +6255,7 @@
             </p:txBody>
           </p:sp>
         </mc:Choice>
-        <mc:Fallback>
+        <mc:Fallback xmlns="">
           <p:sp>
             <p:nvSpPr>
               <p:cNvPr id="3" name="Symbol zastępczy zawartości 2"/>
@@ -5165,8 +6293,8 @@
           </p:sp>
         </mc:Fallback>
       </mc:AlternateContent>
-      <mc:AlternateContent xmlns:mc="http://schemas.openxmlformats.org/markup-compatibility/2006">
-        <mc:Choice xmlns:a14="http://schemas.microsoft.com/office/drawing/2010/main" Requires="a14">
+      <mc:AlternateContent xmlns:mc="http://schemas.openxmlformats.org/markup-compatibility/2006" xmlns:a14="http://schemas.microsoft.com/office/drawing/2010/main">
+        <mc:Choice Requires="a14">
           <p:sp>
             <p:nvSpPr>
               <p:cNvPr id="4" name="Symbol zastępczy zawartości 2"/>
@@ -5773,7 +6901,7 @@
             </p:txBody>
           </p:sp>
         </mc:Choice>
-        <mc:Fallback>
+        <mc:Fallback xmlns="">
           <p:sp>
             <p:nvSpPr>
               <p:cNvPr id="4" name="Symbol zastępczy zawartości 2"/>
@@ -5852,6 +6980,13 @@
   <p:clrMapOvr>
     <a:masterClrMapping/>
   </p:clrMapOvr>
+  <p:timing>
+    <p:tnLst>
+      <p:par>
+        <p:cTn id="1" dur="indefinite" restart="never" nodeType="tmRoot"/>
+      </p:par>
+    </p:tnLst>
+  </p:timing>
 </p:sld>
 </file>
 
@@ -6018,7 +7153,6 @@
               <a:rPr lang="pl-PL" dirty="0" smtClean="0"/>
               <a:t>	}</a:t>
             </a:r>
-            <a:endParaRPr lang="pl-PL" dirty="0" smtClean="0"/>
           </a:p>
           <a:p>
             <a:pPr marL="0" indent="0">
@@ -6047,6 +7181,13 @@
   <p:clrMapOvr>
     <a:masterClrMapping/>
   </p:clrMapOvr>
+  <p:timing>
+    <p:tnLst>
+      <p:par>
+        <p:cTn id="1" dur="indefinite" restart="never" nodeType="tmRoot"/>
+      </p:par>
+    </p:tnLst>
+  </p:timing>
 </p:sld>
 </file>
 
@@ -6409,6 +7550,13 @@
   <p:clrMapOvr>
     <a:masterClrMapping/>
   </p:clrMapOvr>
+  <p:timing>
+    <p:tnLst>
+      <p:par>
+        <p:cTn id="1" dur="indefinite" restart="never" nodeType="tmRoot"/>
+      </p:par>
+    </p:tnLst>
+  </p:timing>
 </p:sld>
 </file>
 

</xml_diff>

<commit_message>
Ukończona pierwsza wersja prezentacji
</commit_message>
<xml_diff>
--- a/Morphing obrazów.pptx
+++ b/Morphing obrazów.pptx
@@ -18,7 +18,9 @@
     <p:sldId id="265" r:id="rId12"/>
     <p:sldId id="268" r:id="rId13"/>
     <p:sldId id="269" r:id="rId14"/>
-    <p:sldId id="266" r:id="rId15"/>
+    <p:sldId id="270" r:id="rId15"/>
+    <p:sldId id="266" r:id="rId16"/>
+    <p:sldId id="271" r:id="rId17"/>
   </p:sldIdLst>
   <p:sldSz cx="12192000" cy="6858000"/>
   <p:notesSz cx="6858000" cy="9144000"/>
@@ -3400,8 +3402,8 @@
         </p:nvSpPr>
         <p:spPr>
           <a:xfrm>
-            <a:off x="3513214" y="1116012"/>
-            <a:ext cx="4852894" cy="369332"/>
+            <a:off x="1765265" y="1022889"/>
+            <a:ext cx="9233647" cy="369332"/>
           </a:xfrm>
           <a:prstGeom prst="rect">
             <a:avLst/>
@@ -3416,7 +3418,15 @@
           <a:p>
             <a:r>
               <a:rPr lang="pl-PL" dirty="0" smtClean="0"/>
-              <a:t>Część funkcji zaimplementowanej w MASM x64</a:t>
+              <a:t>Część głównej </a:t>
+            </a:r>
+            <a:r>
+              <a:rPr lang="pl-PL" dirty="0" smtClean="0"/>
+              <a:t>funkcji zaimplementowanej w MASM </a:t>
+            </a:r>
+            <a:r>
+              <a:rPr lang="pl-PL" dirty="0" smtClean="0"/>
+              <a:t>x64 z użyciem instrukcji wektorowych</a:t>
             </a:r>
             <a:endParaRPr lang="pl-PL" dirty="0"/>
           </a:p>
@@ -4116,16 +4126,23 @@
             <p:ph type="title"/>
           </p:nvPr>
         </p:nvSpPr>
-        <p:spPr/>
-        <p:txBody>
-          <a:bodyPr/>
+        <p:spPr>
+          <a:xfrm>
+            <a:off x="1232647" y="531906"/>
+            <a:ext cx="10515600" cy="549182"/>
+          </a:xfrm>
+        </p:spPr>
+        <p:txBody>
+          <a:bodyPr>
+            <a:normAutofit fontScale="90000"/>
+          </a:bodyPr>
           <a:lstStyle/>
           <a:p>
             <a:r>
               <a:rPr lang="pl-PL" dirty="0" smtClean="0">
                 <a:latin typeface="+mn-lt"/>
               </a:rPr>
-              <a:t>			Aktualny stan prac</a:t>
+              <a:t>			 Wielowątkowość</a:t>
             </a:r>
             <a:endParaRPr lang="pl-PL" dirty="0">
               <a:latin typeface="+mn-lt"/>
@@ -4143,12 +4160,244 @@
             <p:ph idx="1"/>
           </p:nvPr>
         </p:nvSpPr>
-        <p:spPr/>
+        <p:spPr>
+          <a:xfrm>
+            <a:off x="838200" y="1431178"/>
+            <a:ext cx="10515600" cy="421528"/>
+          </a:xfrm>
+        </p:spPr>
+        <p:txBody>
+          <a:bodyPr>
+            <a:noAutofit/>
+          </a:bodyPr>
+          <a:lstStyle/>
+          <a:p>
+            <a:r>
+              <a:rPr lang="pl-PL" dirty="0" smtClean="0"/>
+              <a:t>Wątki liczą źródła kolorów dla kolejnych wierszy obrazu wynikowego </a:t>
+            </a:r>
+            <a:endParaRPr lang="pl-PL" dirty="0"/>
+          </a:p>
+        </p:txBody>
+      </p:sp>
+      <p:pic>
+        <p:nvPicPr>
+          <p:cNvPr id="4" name="Obraz 3"/>
+          <p:cNvPicPr>
+            <a:picLocks noChangeAspect="1"/>
+          </p:cNvPicPr>
+          <p:nvPr/>
+        </p:nvPicPr>
+        <p:blipFill>
+          <a:blip r:embed="rId2">
+            <a:extLst>
+              <a:ext uri="{28A0092B-C50C-407E-A947-70E740481C1C}">
+                <a14:useLocalDpi xmlns:a14="http://schemas.microsoft.com/office/drawing/2010/main" val="0"/>
+              </a:ext>
+            </a:extLst>
+          </a:blip>
+          <a:stretch>
+            <a:fillRect/>
+          </a:stretch>
+        </p:blipFill>
+        <p:spPr>
+          <a:xfrm>
+            <a:off x="2399553" y="2202796"/>
+            <a:ext cx="7392894" cy="3853982"/>
+          </a:xfrm>
+          <a:prstGeom prst="rect">
+            <a:avLst/>
+          </a:prstGeom>
+        </p:spPr>
+      </p:pic>
+    </p:spTree>
+    <p:extLst>
+      <p:ext uri="{BB962C8B-B14F-4D97-AF65-F5344CB8AC3E}">
+        <p14:creationId xmlns:p14="http://schemas.microsoft.com/office/powerpoint/2010/main" val="732334184"/>
+      </p:ext>
+    </p:extLst>
+  </p:cSld>
+  <p:clrMapOvr>
+    <a:masterClrMapping/>
+  </p:clrMapOvr>
+  <p:timing>
+    <p:tnLst>
+      <p:par>
+        <p:cTn id="1" dur="indefinite" restart="never" nodeType="tmRoot"/>
+      </p:par>
+    </p:tnLst>
+  </p:timing>
+</p:sld>
+</file>
+
+<file path=ppt/slides/slide15.xml><?xml version="1.0" encoding="utf-8"?>
+<p:sld xmlns:a="http://schemas.openxmlformats.org/drawingml/2006/main" xmlns:r="http://schemas.openxmlformats.org/officeDocument/2006/relationships" xmlns:p="http://schemas.openxmlformats.org/presentationml/2006/main">
+  <p:cSld>
+    <p:spTree>
+      <p:nvGrpSpPr>
+        <p:cNvPr id="1" name=""/>
+        <p:cNvGrpSpPr/>
+        <p:nvPr/>
+      </p:nvGrpSpPr>
+      <p:grpSpPr>
+        <a:xfrm>
+          <a:off x="0" y="0"/>
+          <a:ext cx="0" cy="0"/>
+          <a:chOff x="0" y="0"/>
+          <a:chExt cx="0" cy="0"/>
+        </a:xfrm>
+      </p:grpSpPr>
+      <p:sp>
+        <p:nvSpPr>
+          <p:cNvPr id="2" name="Tytuł 1"/>
+          <p:cNvSpPr>
+            <a:spLocks noGrp="1"/>
+          </p:cNvSpPr>
+          <p:nvPr>
+            <p:ph type="title"/>
+          </p:nvPr>
+        </p:nvSpPr>
+        <p:spPr>
+          <a:xfrm>
+            <a:off x="838200" y="287431"/>
+            <a:ext cx="11311965" cy="1325563"/>
+          </a:xfrm>
+        </p:spPr>
         <p:txBody>
           <a:bodyPr/>
           <a:lstStyle/>
           <a:p>
-            <a:endParaRPr lang="pl-PL"/>
+            <a:r>
+              <a:rPr lang="pl-PL" dirty="0" smtClean="0">
+                <a:latin typeface="+mn-lt"/>
+              </a:rPr>
+              <a:t>Aktualny </a:t>
+            </a:r>
+            <a:r>
+              <a:rPr lang="pl-PL" dirty="0" smtClean="0">
+                <a:latin typeface="+mn-lt"/>
+              </a:rPr>
+              <a:t>stan </a:t>
+            </a:r>
+            <a:r>
+              <a:rPr lang="pl-PL" dirty="0" smtClean="0">
+                <a:latin typeface="+mn-lt"/>
+              </a:rPr>
+              <a:t>projektu – szczere podsumowanie</a:t>
+            </a:r>
+            <a:endParaRPr lang="pl-PL" dirty="0">
+              <a:latin typeface="+mn-lt"/>
+            </a:endParaRPr>
+          </a:p>
+        </p:txBody>
+      </p:sp>
+      <p:sp>
+        <p:nvSpPr>
+          <p:cNvPr id="3" name="Symbol zastępczy zawartości 2"/>
+          <p:cNvSpPr>
+            <a:spLocks noGrp="1"/>
+          </p:cNvSpPr>
+          <p:nvPr>
+            <p:ph idx="1"/>
+          </p:nvPr>
+        </p:nvSpPr>
+        <p:spPr>
+          <a:xfrm>
+            <a:off x="838200" y="1825625"/>
+            <a:ext cx="10515600" cy="3660775"/>
+          </a:xfrm>
+        </p:spPr>
+        <p:txBody>
+          <a:bodyPr>
+            <a:normAutofit fontScale="92500"/>
+          </a:bodyPr>
+          <a:lstStyle/>
+          <a:p>
+            <a:pPr marL="0" indent="0">
+              <a:buNone/>
+            </a:pPr>
+            <a:r>
+              <a:rPr lang="pl-PL" sz="2400" dirty="0" smtClean="0"/>
+              <a:t>Implementacja kluczowej funkcji w:</a:t>
+            </a:r>
+          </a:p>
+          <a:p>
+            <a:pPr>
+              <a:buFontTx/>
+              <a:buChar char="-"/>
+            </a:pPr>
+            <a:r>
+              <a:rPr lang="pl-PL" sz="2400" dirty="0" smtClean="0"/>
+              <a:t>języku </a:t>
+            </a:r>
+            <a:r>
+              <a:rPr lang="pl-PL" sz="2400" dirty="0"/>
+              <a:t>wysokiego poziomu – ukończona, możliwa </a:t>
+            </a:r>
+            <a:r>
+              <a:rPr lang="pl-PL" sz="2400" dirty="0" smtClean="0"/>
+              <a:t>optymalizacja działań na bitmapie</a:t>
+            </a:r>
+          </a:p>
+          <a:p>
+            <a:pPr>
+              <a:buFontTx/>
+              <a:buChar char="-"/>
+            </a:pPr>
+            <a:r>
+              <a:rPr lang="pl-PL" sz="2400" dirty="0"/>
+              <a:t>j</a:t>
+            </a:r>
+            <a:r>
+              <a:rPr lang="pl-PL" sz="2400" dirty="0" smtClean="0"/>
+              <a:t>ęzyku asemblera – do poprawy, zachowuje się jak funkcja wysokiego poziomu dla danych testowych, nie działa w kontekście głównego programu – możliwe błędy w przekazywaniu danych</a:t>
+            </a:r>
+          </a:p>
+          <a:p>
+            <a:pPr marL="0" indent="0">
+              <a:buNone/>
+            </a:pPr>
+            <a:r>
+              <a:rPr lang="pl-PL" sz="2400" dirty="0" smtClean="0"/>
+              <a:t>Funkcjonalności pomocnicze – zaimplementowane, możliwa optymalizacja.</a:t>
+            </a:r>
+          </a:p>
+          <a:p>
+            <a:pPr marL="0" indent="0">
+              <a:buNone/>
+            </a:pPr>
+            <a:r>
+              <a:rPr lang="pl-PL" sz="2400" dirty="0" smtClean="0"/>
+              <a:t>Obszarowy parametr podobieństwa – do zaimplementowania.</a:t>
+            </a:r>
+            <a:endParaRPr lang="pl-PL" sz="2400" dirty="0" smtClean="0"/>
+          </a:p>
+          <a:p>
+            <a:pPr marL="0" indent="0">
+              <a:buNone/>
+            </a:pPr>
+            <a:r>
+              <a:rPr lang="pl-PL" sz="2400" dirty="0" smtClean="0"/>
+              <a:t>Podział na wątki – początek prac.</a:t>
+            </a:r>
+          </a:p>
+          <a:p>
+            <a:pPr marL="0" indent="0">
+              <a:buNone/>
+            </a:pPr>
+            <a:r>
+              <a:rPr lang="pl-PL" sz="2400" dirty="0" smtClean="0"/>
+              <a:t>GUI – zaimplementowane podstawowe działanie, </a:t>
+            </a:r>
+            <a:r>
+              <a:rPr lang="pl-PL" sz="2400" dirty="0" smtClean="0"/>
+              <a:t>potrzeba </a:t>
+            </a:r>
+            <a:r>
+              <a:rPr lang="pl-PL" sz="2400" dirty="0" smtClean="0"/>
+              <a:t>zwiększenia funkcjonalności.</a:t>
+            </a:r>
+            <a:endParaRPr lang="pl-PL" sz="2400" dirty="0"/>
           </a:p>
         </p:txBody>
       </p:sp>
@@ -4156,6 +4405,118 @@
     <p:extLst>
       <p:ext uri="{BB962C8B-B14F-4D97-AF65-F5344CB8AC3E}">
         <p14:creationId xmlns:p14="http://schemas.microsoft.com/office/powerpoint/2010/main" val="1340592181"/>
+      </p:ext>
+    </p:extLst>
+  </p:cSld>
+  <p:clrMapOvr>
+    <a:masterClrMapping/>
+  </p:clrMapOvr>
+  <p:timing>
+    <p:tnLst>
+      <p:par>
+        <p:cTn id="1" dur="indefinite" restart="never" nodeType="tmRoot"/>
+      </p:par>
+    </p:tnLst>
+  </p:timing>
+</p:sld>
+</file>
+
+<file path=ppt/slides/slide16.xml><?xml version="1.0" encoding="utf-8"?>
+<p:sld xmlns:a="http://schemas.openxmlformats.org/drawingml/2006/main" xmlns:r="http://schemas.openxmlformats.org/officeDocument/2006/relationships" xmlns:p="http://schemas.openxmlformats.org/presentationml/2006/main">
+  <p:cSld>
+    <p:spTree>
+      <p:nvGrpSpPr>
+        <p:cNvPr id="1" name=""/>
+        <p:cNvGrpSpPr/>
+        <p:nvPr/>
+      </p:nvGrpSpPr>
+      <p:grpSpPr>
+        <a:xfrm>
+          <a:off x="0" y="0"/>
+          <a:ext cx="0" cy="0"/>
+          <a:chOff x="0" y="0"/>
+          <a:chExt cx="0" cy="0"/>
+        </a:xfrm>
+      </p:grpSpPr>
+      <p:sp>
+        <p:nvSpPr>
+          <p:cNvPr id="2" name="Tytuł 1"/>
+          <p:cNvSpPr>
+            <a:spLocks noGrp="1"/>
+          </p:cNvSpPr>
+          <p:nvPr>
+            <p:ph type="title"/>
+          </p:nvPr>
+        </p:nvSpPr>
+        <p:spPr>
+          <a:xfrm>
+            <a:off x="2768600" y="2337360"/>
+            <a:ext cx="6530788" cy="1325563"/>
+          </a:xfrm>
+        </p:spPr>
+        <p:txBody>
+          <a:bodyPr>
+            <a:noAutofit/>
+          </a:bodyPr>
+          <a:lstStyle/>
+          <a:p>
+            <a:r>
+              <a:rPr lang="pl-PL" sz="6600" dirty="0" smtClean="0">
+                <a:latin typeface="+mn-lt"/>
+              </a:rPr>
+              <a:t>Dziękuję za uwagę</a:t>
+            </a:r>
+            <a:endParaRPr lang="pl-PL" sz="6600" dirty="0">
+              <a:latin typeface="+mn-lt"/>
+            </a:endParaRPr>
+          </a:p>
+        </p:txBody>
+      </p:sp>
+      <p:sp>
+        <p:nvSpPr>
+          <p:cNvPr id="3" name="Symbol zastępczy zawartości 2"/>
+          <p:cNvSpPr>
+            <a:spLocks noGrp="1"/>
+          </p:cNvSpPr>
+          <p:nvPr>
+            <p:ph idx="1"/>
+          </p:nvPr>
+        </p:nvSpPr>
+        <p:spPr>
+          <a:xfrm>
+            <a:off x="2995706" y="4748119"/>
+            <a:ext cx="6303682" cy="481293"/>
+          </a:xfrm>
+        </p:spPr>
+        <p:txBody>
+          <a:bodyPr>
+            <a:normAutofit fontScale="77500" lnSpcReduction="20000"/>
+          </a:bodyPr>
+          <a:lstStyle/>
+          <a:p>
+            <a:pPr marL="0" indent="0">
+              <a:buNone/>
+            </a:pPr>
+            <a:r>
+              <a:rPr lang="pl-PL" dirty="0" smtClean="0"/>
+              <a:t>Autor: Piotr Gazda gr. 3 sekcja 2 AEI </a:t>
+            </a:r>
+            <a:r>
+              <a:rPr lang="pl-PL" dirty="0" err="1" smtClean="0"/>
+              <a:t>Inf</a:t>
+            </a:r>
+            <a:r>
+              <a:rPr lang="pl-PL" dirty="0" smtClean="0"/>
+              <a:t> sem5 2020</a:t>
+            </a:r>
+            <a:endParaRPr lang="pl-PL" dirty="0"/>
+          </a:p>
+        </p:txBody>
+      </p:sp>
+    </p:spTree>
+    <p:extLst>
+      <p:ext uri="{BB962C8B-B14F-4D97-AF65-F5344CB8AC3E}">
+        <p14:creationId xmlns:p14="http://schemas.microsoft.com/office/powerpoint/2010/main" val="988688745"/>
       </p:ext>
     </p:extLst>
   </p:cSld>
@@ -4201,7 +4562,7 @@
         </p:nvSpPr>
         <p:spPr>
           <a:xfrm>
-            <a:off x="838200" y="179293"/>
+            <a:off x="785905" y="531904"/>
             <a:ext cx="10515600" cy="1027300"/>
           </a:xfrm>
         </p:spPr>
@@ -4247,8 +4608,8 @@
         </p:nvSpPr>
         <p:spPr>
           <a:xfrm>
-            <a:off x="838200" y="1825625"/>
-            <a:ext cx="10515600" cy="2088963"/>
+            <a:off x="1580776" y="2100543"/>
+            <a:ext cx="9720729" cy="2088963"/>
           </a:xfrm>
         </p:spPr>
         <p:txBody>
@@ -5649,8 +6010,8 @@
           </a:fontRef>
         </p:style>
       </p:cxnSp>
-      <mc:AlternateContent xmlns:mc="http://schemas.openxmlformats.org/markup-compatibility/2006">
-        <mc:Choice xmlns:a14="http://schemas.microsoft.com/office/drawing/2010/main" Requires="a14">
+      <mc:AlternateContent xmlns:mc="http://schemas.openxmlformats.org/markup-compatibility/2006" xmlns:a14="http://schemas.microsoft.com/office/drawing/2010/main">
+        <mc:Choice Requires="a14">
           <p:sp>
             <p:nvSpPr>
               <p:cNvPr id="12" name="pole tekstowe 11"/>
@@ -5673,6 +6034,7 @@
               </a:bodyPr>
               <a:lstStyle/>
               <a:p>
+                <a:pPr/>
                 <a14:m>
                   <m:oMathPara xmlns:m="http://schemas.openxmlformats.org/officeDocument/2006/math">
                     <m:oMathParaPr>
@@ -5855,7 +6217,7 @@
             </p:txBody>
           </p:sp>
         </mc:Choice>
-        <mc:Fallback>
+        <mc:Fallback xmlns="">
           <p:sp>
             <p:nvSpPr>
               <p:cNvPr id="12" name="pole tekstowe 11"/>
@@ -7380,7 +7742,7 @@
         </p:nvSpPr>
         <p:spPr>
           <a:xfrm>
-            <a:off x="1649506" y="1846076"/>
+            <a:off x="1649506" y="1523272"/>
             <a:ext cx="3526118" cy="830997"/>
           </a:xfrm>
           <a:prstGeom prst="rect">
@@ -7410,8 +7772,8 @@
         </p:nvCxnSpPr>
         <p:spPr>
           <a:xfrm>
-            <a:off x="3412565" y="2970306"/>
-            <a:ext cx="0" cy="1541929"/>
+            <a:off x="3412565" y="4757268"/>
+            <a:ext cx="0" cy="633508"/>
           </a:xfrm>
           <a:prstGeom prst="straightConnector1">
             <a:avLst/>
@@ -7446,7 +7808,7 @@
         </p:nvSpPr>
         <p:spPr>
           <a:xfrm>
-            <a:off x="1602441" y="4697506"/>
+            <a:off x="1555377" y="5390776"/>
             <a:ext cx="3620247" cy="830997"/>
           </a:xfrm>
           <a:prstGeom prst="rect">
@@ -7536,6 +7898,80 @@
             </a:r>
           </a:p>
           <a:p>
+            <a:endParaRPr lang="pl-PL" dirty="0"/>
+          </a:p>
+        </p:txBody>
+      </p:sp>
+      <p:sp>
+        <p:nvSpPr>
+          <p:cNvPr id="3" name="pole tekstowe 2"/>
+          <p:cNvSpPr txBox="1"/>
+          <p:nvPr/>
+        </p:nvSpPr>
+        <p:spPr>
+          <a:xfrm>
+            <a:off x="807570" y="2389182"/>
+            <a:ext cx="5115859" cy="2308324"/>
+          </a:xfrm>
+          <a:prstGeom prst="rect">
+            <a:avLst/>
+          </a:prstGeom>
+          <a:noFill/>
+        </p:spPr>
+        <p:txBody>
+          <a:bodyPr wrap="square" rtlCol="0">
+            <a:spAutoFit/>
+          </a:bodyPr>
+          <a:lstStyle/>
+          <a:p>
+            <a:pPr marL="342900" indent="-342900">
+              <a:buFont typeface="Arial" panose="020B0604020202020204" pitchFamily="34" charset="0"/>
+              <a:buChar char="•"/>
+            </a:pPr>
+            <a:r>
+              <a:rPr lang="pl-PL" dirty="0" smtClean="0"/>
+              <a:t>Bezpośrednie operowanie na pikselach bitmapy</a:t>
+            </a:r>
+          </a:p>
+          <a:p>
+            <a:pPr marL="342900" indent="-342900">
+              <a:buFont typeface="Arial" panose="020B0604020202020204" pitchFamily="34" charset="0"/>
+              <a:buChar char="•"/>
+            </a:pPr>
+            <a:r>
+              <a:rPr lang="pl-PL" dirty="0" smtClean="0"/>
+              <a:t>Obliczenie dystansów między punktami charakterystycznymi na obrazie wyjściowym i wejściowych</a:t>
+            </a:r>
+          </a:p>
+          <a:p>
+            <a:pPr marL="342900" indent="-342900">
+              <a:buFont typeface="Arial" panose="020B0604020202020204" pitchFamily="34" charset="0"/>
+              <a:buChar char="•"/>
+            </a:pPr>
+            <a:r>
+              <a:rPr lang="pl-PL" dirty="0" smtClean="0"/>
+              <a:t>Warunki gwarantujące niewychodzenie poza zakres obrazu, poprawność liczb, itp.</a:t>
+            </a:r>
+          </a:p>
+          <a:p>
+            <a:pPr marL="342900" indent="-342900">
+              <a:buFont typeface="Arial" panose="020B0604020202020204" pitchFamily="34" charset="0"/>
+              <a:buChar char="•"/>
+            </a:pPr>
+            <a:r>
+              <a:rPr lang="pl-PL" dirty="0" smtClean="0"/>
+              <a:t>Obsługa reszty obliczeń</a:t>
+            </a:r>
+          </a:p>
+          <a:p>
+            <a:pPr marL="342900" indent="-342900">
+              <a:buFont typeface="Arial" panose="020B0604020202020204" pitchFamily="34" charset="0"/>
+              <a:buChar char="•"/>
+            </a:pPr>
+            <a:r>
+              <a:rPr lang="pl-PL" dirty="0" smtClean="0"/>
+              <a:t>GUI</a:t>
+            </a:r>
             <a:endParaRPr lang="pl-PL" dirty="0"/>
           </a:p>
         </p:txBody>

</xml_diff>